<commit_message>
ENH: pptgen2 has a slidesense console script
</commit_message>
<xml_diff>
--- a/testlib/input2.pptx
+++ b/testlib/input2.pptx
@@ -3489,7 +3489,7 @@
           <a:p>
             <a:fld id="{13E8670D-DACE-4106-9284-EFC2D346D8FE}" type="datetimeFigureOut">
               <a:rPr lang="en-US" smtClean="0"/>
-              <a:t>7/3/2020</a:t>
+              <a:t>7/11/2020</a:t>
             </a:fld>
             <a:endParaRPr lang="en-US" dirty="0"/>
           </a:p>
@@ -3654,7 +3654,7 @@
           <a:p>
             <a:fld id="{B55C8D6E-200A-4257-BFED-522F4EBA3D4A}" type="datetimeFigureOut">
               <a:rPr lang="en-US" smtClean="0"/>
-              <a:t>7/3/2020</a:t>
+              <a:t>7/11/2020</a:t>
             </a:fld>
             <a:endParaRPr lang="en-US" dirty="0"/>
           </a:p>
@@ -4037,7 +4037,7 @@
           <a:p>
             <a:fld id="{DE2C6F76-5EDA-4247-B34D-42592F5122A8}" type="datetime1">
               <a:rPr lang="en-US" smtClean="0"/>
-              <a:t>7/3/2020</a:t>
+              <a:t>7/11/2020</a:t>
             </a:fld>
             <a:endParaRPr lang="en-US" dirty="0"/>
           </a:p>
@@ -4237,7 +4237,7 @@
             <a:fld id="{33D6D1A4-82FD-416F-B454-ACF63A7912F0}" type="datetime1">
               <a:rPr lang="en-US" smtClean="0"/>
               <a:pPr/>
-              <a:t>7/3/2020</a:t>
+              <a:t>7/11/2020</a:t>
             </a:fld>
             <a:endParaRPr lang="en-US" dirty="0"/>
           </a:p>
@@ -12001,7 +12001,7 @@
           <p:nvPr>
             <p:extLst>
               <p:ext uri="{D42A27DB-BD31-4B8C-83A1-F6EECF244321}">
-                <p14:modId xmlns:p14="http://schemas.microsoft.com/office/powerpoint/2010/main" val="4079172880"/>
+                <p14:modId xmlns:p14="http://schemas.microsoft.com/office/powerpoint/2010/main" val="2635382578"/>
               </p:ext>
             </p:extLst>
           </p:nvPr>
@@ -12467,7 +12467,10 @@
                     <a:bodyPr/>
                     <a:lstStyle/>
                     <a:p>
-                      <a:endParaRPr lang="en-US" sz="1000" dirty="0"/>
+                      <a:r>
+                        <a:rPr lang="en-US" sz="1000" dirty="0"/>
+                        <a:t>Val 1</a:t>
+                      </a:r>
                     </a:p>
                   </a:txBody>
                   <a:tcPr>
@@ -12850,7 +12853,10 @@
                     <a:bodyPr/>
                     <a:lstStyle/>
                     <a:p>
-                      <a:endParaRPr lang="en-US" sz="1000" dirty="0"/>
+                      <a:r>
+                        <a:rPr lang="en-US" sz="1000" dirty="0"/>
+                        <a:t>Val 2</a:t>
+                      </a:r>
                     </a:p>
                   </a:txBody>
                   <a:tcPr>

</xml_diff>

<commit_message>
ENH: pptgen2 supports donut charts
</commit_message>
<xml_diff>
--- a/testlib/input2.pptx
+++ b/testlib/input2.pptx
@@ -1093,6 +1093,11 @@
               </a:ln>
               <a:effectLst/>
             </c:spPr>
+            <c:extLst>
+              <c:ext xmlns:c16="http://schemas.microsoft.com/office/drawing/2014/chart" uri="{C3380CC4-5D6E-409C-BE32-E72D297353CC}">
+                <c16:uniqueId val="{00000001-D6B5-487A-8016-29F39402237B}"/>
+              </c:ext>
+            </c:extLst>
           </c:dPt>
           <c:dPt>
             <c:idx val="1"/>
@@ -1108,6 +1113,11 @@
               </a:ln>
               <a:effectLst/>
             </c:spPr>
+            <c:extLst>
+              <c:ext xmlns:c16="http://schemas.microsoft.com/office/drawing/2014/chart" uri="{C3380CC4-5D6E-409C-BE32-E72D297353CC}">
+                <c16:uniqueId val="{00000003-D6B5-487A-8016-29F39402237B}"/>
+              </c:ext>
+            </c:extLst>
           </c:dPt>
           <c:dPt>
             <c:idx val="2"/>
@@ -1123,6 +1133,11 @@
               </a:ln>
               <a:effectLst/>
             </c:spPr>
+            <c:extLst>
+              <c:ext xmlns:c16="http://schemas.microsoft.com/office/drawing/2014/chart" uri="{C3380CC4-5D6E-409C-BE32-E72D297353CC}">
+                <c16:uniqueId val="{00000005-D6B5-487A-8016-29F39402237B}"/>
+              </c:ext>
+            </c:extLst>
           </c:dPt>
           <c:dPt>
             <c:idx val="3"/>
@@ -1138,6 +1153,11 @@
               </a:ln>
               <a:effectLst/>
             </c:spPr>
+            <c:extLst>
+              <c:ext xmlns:c16="http://schemas.microsoft.com/office/drawing/2014/chart" uri="{C3380CC4-5D6E-409C-BE32-E72D297353CC}">
+                <c16:uniqueId val="{00000007-D6B5-487A-8016-29F39402237B}"/>
+              </c:ext>
+            </c:extLst>
           </c:dPt>
           <c:cat>
             <c:strRef>
@@ -2262,6 +2282,281 @@
     <a:p>
       <a:pPr>
         <a:defRPr sz="300"/>
+      </a:pPr>
+      <a:endParaRPr lang="en-US"/>
+    </a:p>
+  </c:txPr>
+  <c:externalData r:id="rId3">
+    <c:autoUpdate val="0"/>
+  </c:externalData>
+</c:chartSpace>
+</file>
+
+<file path=ppt/charts/chart14.xml><?xml version="1.0" encoding="utf-8"?>
+<c:chartSpace xmlns:c="http://schemas.openxmlformats.org/drawingml/2006/chart" xmlns:a="http://schemas.openxmlformats.org/drawingml/2006/main" xmlns:r="http://schemas.openxmlformats.org/officeDocument/2006/relationships" xmlns:c16r2="http://schemas.microsoft.com/office/drawing/2015/06/chart">
+  <c:date1904 val="0"/>
+  <c:lang val="en-US"/>
+  <c:roundedCorners val="0"/>
+  <mc:AlternateContent xmlns:mc="http://schemas.openxmlformats.org/markup-compatibility/2006">
+    <mc:Choice xmlns:c14="http://schemas.microsoft.com/office/drawing/2007/8/2/chart" Requires="c14">
+      <c14:style val="102"/>
+    </mc:Choice>
+    <mc:Fallback>
+      <c:style val="2"/>
+    </mc:Fallback>
+  </mc:AlternateContent>
+  <c:chart>
+    <c:title>
+      <c:overlay val="0"/>
+      <c:spPr>
+        <a:noFill/>
+        <a:ln>
+          <a:noFill/>
+        </a:ln>
+        <a:effectLst/>
+      </c:spPr>
+      <c:txPr>
+        <a:bodyPr rot="0" spcFirstLastPara="1" vertOverflow="ellipsis" vert="horz" wrap="square" anchor="ctr" anchorCtr="1"/>
+        <a:lstStyle/>
+        <a:p>
+          <a:pPr>
+            <a:defRPr sz="720" b="0" i="0" u="none" strike="noStrike" kern="1200" spc="0" baseline="0">
+              <a:solidFill>
+                <a:schemeClr val="tx1">
+                  <a:lumMod val="65000"/>
+                  <a:lumOff val="35000"/>
+                </a:schemeClr>
+              </a:solidFill>
+              <a:latin typeface="+mn-lt"/>
+              <a:ea typeface="+mn-ea"/>
+              <a:cs typeface="+mn-cs"/>
+            </a:defRPr>
+          </a:pPr>
+          <a:endParaRPr lang="en-US"/>
+        </a:p>
+      </c:txPr>
+    </c:title>
+    <c:autoTitleDeleted val="0"/>
+    <c:plotArea>
+      <c:layout/>
+      <c:doughnutChart>
+        <c:varyColors val="1"/>
+        <c:ser>
+          <c:idx val="0"/>
+          <c:order val="0"/>
+          <c:tx>
+            <c:strRef>
+              <c:f>Sheet1!$B$1</c:f>
+              <c:strCache>
+                <c:ptCount val="1"/>
+                <c:pt idx="0">
+                  <c:v>Sales</c:v>
+                </c:pt>
+              </c:strCache>
+            </c:strRef>
+          </c:tx>
+          <c:dPt>
+            <c:idx val="0"/>
+            <c:bubble3D val="0"/>
+            <c:spPr>
+              <a:solidFill>
+                <a:schemeClr val="accent1"/>
+              </a:solidFill>
+              <a:ln w="19050">
+                <a:solidFill>
+                  <a:schemeClr val="lt1"/>
+                </a:solidFill>
+              </a:ln>
+              <a:effectLst/>
+            </c:spPr>
+            <c:extLst>
+              <c:ext xmlns:c16="http://schemas.microsoft.com/office/drawing/2014/chart" uri="{C3380CC4-5D6E-409C-BE32-E72D297353CC}">
+                <c16:uniqueId val="{00000001-D6B5-487A-8016-29F39402237B}"/>
+              </c:ext>
+            </c:extLst>
+          </c:dPt>
+          <c:dPt>
+            <c:idx val="1"/>
+            <c:bubble3D val="0"/>
+            <c:spPr>
+              <a:solidFill>
+                <a:schemeClr val="accent2"/>
+              </a:solidFill>
+              <a:ln w="19050">
+                <a:solidFill>
+                  <a:schemeClr val="lt1"/>
+                </a:solidFill>
+              </a:ln>
+              <a:effectLst/>
+            </c:spPr>
+            <c:extLst>
+              <c:ext xmlns:c16="http://schemas.microsoft.com/office/drawing/2014/chart" uri="{C3380CC4-5D6E-409C-BE32-E72D297353CC}">
+                <c16:uniqueId val="{00000003-D6B5-487A-8016-29F39402237B}"/>
+              </c:ext>
+            </c:extLst>
+          </c:dPt>
+          <c:dPt>
+            <c:idx val="2"/>
+            <c:bubble3D val="0"/>
+            <c:spPr>
+              <a:solidFill>
+                <a:schemeClr val="accent3"/>
+              </a:solidFill>
+              <a:ln w="19050">
+                <a:solidFill>
+                  <a:schemeClr val="lt1"/>
+                </a:solidFill>
+              </a:ln>
+              <a:effectLst/>
+            </c:spPr>
+            <c:extLst>
+              <c:ext xmlns:c16="http://schemas.microsoft.com/office/drawing/2014/chart" uri="{C3380CC4-5D6E-409C-BE32-E72D297353CC}">
+                <c16:uniqueId val="{00000005-D6B5-487A-8016-29F39402237B}"/>
+              </c:ext>
+            </c:extLst>
+          </c:dPt>
+          <c:dPt>
+            <c:idx val="3"/>
+            <c:bubble3D val="0"/>
+            <c:spPr>
+              <a:solidFill>
+                <a:schemeClr val="accent4"/>
+              </a:solidFill>
+              <a:ln w="19050">
+                <a:solidFill>
+                  <a:schemeClr val="lt1"/>
+                </a:solidFill>
+              </a:ln>
+              <a:effectLst/>
+            </c:spPr>
+            <c:extLst>
+              <c:ext xmlns:c16="http://schemas.microsoft.com/office/drawing/2014/chart" uri="{C3380CC4-5D6E-409C-BE32-E72D297353CC}">
+                <c16:uniqueId val="{00000007-D6B5-487A-8016-29F39402237B}"/>
+              </c:ext>
+            </c:extLst>
+          </c:dPt>
+          <c:cat>
+            <c:strRef>
+              <c:f>Sheet1!$A$2:$A$5</c:f>
+              <c:strCache>
+                <c:ptCount val="4"/>
+                <c:pt idx="0">
+                  <c:v>1st Qtr</c:v>
+                </c:pt>
+                <c:pt idx="1">
+                  <c:v>2nd Qtr</c:v>
+                </c:pt>
+                <c:pt idx="2">
+                  <c:v>3rd Qtr</c:v>
+                </c:pt>
+                <c:pt idx="3">
+                  <c:v>4th Qtr</c:v>
+                </c:pt>
+              </c:strCache>
+            </c:strRef>
+          </c:cat>
+          <c:val>
+            <c:numRef>
+              <c:f>Sheet1!$B$2:$B$5</c:f>
+              <c:numCache>
+                <c:formatCode>General</c:formatCode>
+                <c:ptCount val="4"/>
+                <c:pt idx="0">
+                  <c:v>8.1999999999999993</c:v>
+                </c:pt>
+                <c:pt idx="1">
+                  <c:v>3.2</c:v>
+                </c:pt>
+                <c:pt idx="2">
+                  <c:v>1.4</c:v>
+                </c:pt>
+                <c:pt idx="3">
+                  <c:v>1.2</c:v>
+                </c:pt>
+              </c:numCache>
+            </c:numRef>
+          </c:val>
+          <c:extLst>
+            <c:ext xmlns:c16="http://schemas.microsoft.com/office/drawing/2014/chart" uri="{C3380CC4-5D6E-409C-BE32-E72D297353CC}">
+              <c16:uniqueId val="{00000000-F5D6-4AF2-BF04-8148179FDAA8}"/>
+            </c:ext>
+          </c:extLst>
+        </c:ser>
+        <c:dLbls>
+          <c:showLegendKey val="0"/>
+          <c:showVal val="0"/>
+          <c:showCatName val="0"/>
+          <c:showSerName val="0"/>
+          <c:showPercent val="0"/>
+          <c:showBubbleSize val="0"/>
+          <c:showLeaderLines val="1"/>
+        </c:dLbls>
+        <c:firstSliceAng val="0"/>
+        <c:holeSize val="50"/>
+      </c:doughnutChart>
+      <c:spPr>
+        <a:noFill/>
+        <a:ln>
+          <a:noFill/>
+        </a:ln>
+        <a:effectLst/>
+      </c:spPr>
+    </c:plotArea>
+    <c:legend>
+      <c:legendPos val="b"/>
+      <c:overlay val="0"/>
+      <c:spPr>
+        <a:noFill/>
+        <a:ln>
+          <a:noFill/>
+        </a:ln>
+        <a:effectLst/>
+      </c:spPr>
+      <c:txPr>
+        <a:bodyPr rot="0" spcFirstLastPara="1" vertOverflow="ellipsis" vert="horz" wrap="square" anchor="ctr" anchorCtr="1"/>
+        <a:lstStyle/>
+        <a:p>
+          <a:pPr>
+            <a:defRPr sz="600" b="0" i="0" u="none" strike="noStrike" kern="1200" baseline="0">
+              <a:solidFill>
+                <a:schemeClr val="tx1">
+                  <a:lumMod val="65000"/>
+                  <a:lumOff val="35000"/>
+                </a:schemeClr>
+              </a:solidFill>
+              <a:latin typeface="+mn-lt"/>
+              <a:ea typeface="+mn-ea"/>
+              <a:cs typeface="+mn-cs"/>
+            </a:defRPr>
+          </a:pPr>
+          <a:endParaRPr lang="en-US"/>
+        </a:p>
+      </c:txPr>
+    </c:legend>
+    <c:plotVisOnly val="1"/>
+    <c:dispBlanksAs val="gap"/>
+    <c:extLst>
+      <c:ext xmlns:c16r3="http://schemas.microsoft.com/office/drawing/2017/03/chart" uri="{56B9EC1D-385E-4148-901F-78D8002777C0}">
+        <c16r3:dataDisplayOptions16>
+          <c16r3:dispNaAsBlank val="1"/>
+        </c16r3:dataDisplayOptions16>
+      </c:ext>
+    </c:extLst>
+    <c:showDLblsOverMax val="0"/>
+  </c:chart>
+  <c:spPr>
+    <a:noFill/>
+    <a:ln>
+      <a:noFill/>
+    </a:ln>
+    <a:effectLst/>
+  </c:spPr>
+  <c:txPr>
+    <a:bodyPr/>
+    <a:lstStyle/>
+    <a:p>
+      <a:pPr>
+        <a:defRPr sz="600"/>
       </a:pPr>
       <a:endParaRPr lang="en-US"/>
     </a:p>
@@ -5031,9 +5326,6 @@
           <c:dPt>
             <c:idx val="1"/>
             <c:bubble3D val="0"/>
-            <c:spPr>
-              <a:effectLst/>
-            </c:spPr>
             <c:extLst>
               <c:ext xmlns:c16="http://schemas.microsoft.com/office/drawing/2014/chart" uri="{C3380CC4-5D6E-409C-BE32-E72D297353CC}">
                 <c16:uniqueId val="{00000001-C9B8-47E0-9725-8E83749F9FF9}"/>
@@ -5043,9 +5335,6 @@
           <c:dPt>
             <c:idx val="2"/>
             <c:bubble3D val="0"/>
-            <c:spPr>
-              <a:effectLst/>
-            </c:spPr>
             <c:extLst>
               <c:ext xmlns:c16="http://schemas.microsoft.com/office/drawing/2014/chart" uri="{C3380CC4-5D6E-409C-BE32-E72D297353CC}">
                 <c16:uniqueId val="{00000002-C9B8-47E0-9725-8E83749F9FF9}"/>
@@ -5055,9 +5344,6 @@
           <c:dPt>
             <c:idx val="3"/>
             <c:bubble3D val="0"/>
-            <c:spPr>
-              <a:effectLst/>
-            </c:spPr>
             <c:extLst>
               <c:ext xmlns:c16="http://schemas.microsoft.com/office/drawing/2014/chart" uri="{C3380CC4-5D6E-409C-BE32-E72D297353CC}">
                 <c16:uniqueId val="{00000003-C9B8-47E0-9725-8E83749F9FF9}"/>
@@ -5067,9 +5353,6 @@
           <c:dPt>
             <c:idx val="4"/>
             <c:bubble3D val="0"/>
-            <c:spPr>
-              <a:effectLst/>
-            </c:spPr>
             <c:extLst>
               <c:ext xmlns:c16="http://schemas.microsoft.com/office/drawing/2014/chart" uri="{C3380CC4-5D6E-409C-BE32-E72D297353CC}">
                 <c16:uniqueId val="{00000004-C9B8-47E0-9725-8E83749F9FF9}"/>
@@ -5079,9 +5362,6 @@
           <c:dPt>
             <c:idx val="5"/>
             <c:bubble3D val="0"/>
-            <c:spPr>
-              <a:effectLst/>
-            </c:spPr>
             <c:extLst>
               <c:ext xmlns:c16="http://schemas.microsoft.com/office/drawing/2014/chart" uri="{C3380CC4-5D6E-409C-BE32-E72D297353CC}">
                 <c16:uniqueId val="{00000005-C9B8-47E0-9725-8E83749F9FF9}"/>
@@ -5091,9 +5371,6 @@
           <c:dPt>
             <c:idx val="6"/>
             <c:bubble3D val="0"/>
-            <c:spPr>
-              <a:effectLst/>
-            </c:spPr>
             <c:extLst>
               <c:ext xmlns:c16="http://schemas.microsoft.com/office/drawing/2014/chart" uri="{C3380CC4-5D6E-409C-BE32-E72D297353CC}">
                 <c16:uniqueId val="{00000006-C9B8-47E0-9725-8E83749F9FF9}"/>
@@ -5103,9 +5380,6 @@
           <c:dPt>
             <c:idx val="7"/>
             <c:bubble3D val="0"/>
-            <c:spPr>
-              <a:effectLst/>
-            </c:spPr>
             <c:extLst>
               <c:ext xmlns:c16="http://schemas.microsoft.com/office/drawing/2014/chart" uri="{C3380CC4-5D6E-409C-BE32-E72D297353CC}">
                 <c16:uniqueId val="{00000007-C9B8-47E0-9725-8E83749F9FF9}"/>
@@ -5115,9 +5389,6 @@
           <c:dPt>
             <c:idx val="8"/>
             <c:bubble3D val="0"/>
-            <c:spPr>
-              <a:effectLst/>
-            </c:spPr>
             <c:extLst>
               <c:ext xmlns:c16="http://schemas.microsoft.com/office/drawing/2014/chart" uri="{C3380CC4-5D6E-409C-BE32-E72D297353CC}">
                 <c16:uniqueId val="{00000008-C9B8-47E0-9725-8E83749F9FF9}"/>
@@ -5127,9 +5398,6 @@
           <c:dPt>
             <c:idx val="9"/>
             <c:bubble3D val="0"/>
-            <c:spPr>
-              <a:effectLst/>
-            </c:spPr>
             <c:extLst>
               <c:ext xmlns:c16="http://schemas.microsoft.com/office/drawing/2014/chart" uri="{C3380CC4-5D6E-409C-BE32-E72D297353CC}">
                 <c16:uniqueId val="{00000009-C9B8-47E0-9725-8E83749F9FF9}"/>
@@ -5139,9 +5407,6 @@
           <c:dPt>
             <c:idx val="10"/>
             <c:bubble3D val="0"/>
-            <c:spPr>
-              <a:effectLst/>
-            </c:spPr>
             <c:extLst>
               <c:ext xmlns:c16="http://schemas.microsoft.com/office/drawing/2014/chart" uri="{C3380CC4-5D6E-409C-BE32-E72D297353CC}">
                 <c16:uniqueId val="{0000000A-C9B8-47E0-9725-8E83749F9FF9}"/>
@@ -5151,9 +5416,6 @@
           <c:dPt>
             <c:idx val="11"/>
             <c:bubble3D val="0"/>
-            <c:spPr>
-              <a:effectLst/>
-            </c:spPr>
             <c:extLst>
               <c:ext xmlns:c16="http://schemas.microsoft.com/office/drawing/2014/chart" uri="{C3380CC4-5D6E-409C-BE32-E72D297353CC}">
                 <c16:uniqueId val="{0000000B-C9B8-47E0-9725-8E83749F9FF9}"/>
@@ -5163,9 +5425,6 @@
           <c:dPt>
             <c:idx val="12"/>
             <c:bubble3D val="0"/>
-            <c:spPr>
-              <a:effectLst/>
-            </c:spPr>
             <c:extLst>
               <c:ext xmlns:c16="http://schemas.microsoft.com/office/drawing/2014/chart" uri="{C3380CC4-5D6E-409C-BE32-E72D297353CC}">
                 <c16:uniqueId val="{0000000C-C9B8-47E0-9725-8E83749F9FF9}"/>
@@ -5175,9 +5434,6 @@
           <c:dPt>
             <c:idx val="13"/>
             <c:bubble3D val="0"/>
-            <c:spPr>
-              <a:effectLst/>
-            </c:spPr>
             <c:extLst>
               <c:ext xmlns:c16="http://schemas.microsoft.com/office/drawing/2014/chart" uri="{C3380CC4-5D6E-409C-BE32-E72D297353CC}">
                 <c16:uniqueId val="{0000000D-C9B8-47E0-9725-8E83749F9FF9}"/>
@@ -5187,9 +5443,6 @@
           <c:dPt>
             <c:idx val="14"/>
             <c:bubble3D val="0"/>
-            <c:spPr>
-              <a:effectLst/>
-            </c:spPr>
             <c:extLst>
               <c:ext xmlns:c16="http://schemas.microsoft.com/office/drawing/2014/chart" uri="{C3380CC4-5D6E-409C-BE32-E72D297353CC}">
                 <c16:uniqueId val="{0000000E-C9B8-47E0-9725-8E83749F9FF9}"/>
@@ -7982,6 +8235,46 @@
 </cs:colorStyle>
 </file>
 
+<file path=ppt/charts/colors18.xml><?xml version="1.0" encoding="utf-8"?>
+<cs:colorStyle xmlns:cs="http://schemas.microsoft.com/office/drawing/2012/chartStyle" xmlns:a="http://schemas.openxmlformats.org/drawingml/2006/main" meth="cycle" id="10">
+  <a:schemeClr val="accent1"/>
+  <a:schemeClr val="accent2"/>
+  <a:schemeClr val="accent3"/>
+  <a:schemeClr val="accent4"/>
+  <a:schemeClr val="accent5"/>
+  <a:schemeClr val="accent6"/>
+  <cs:variation/>
+  <cs:variation>
+    <a:lumMod val="60000"/>
+  </cs:variation>
+  <cs:variation>
+    <a:lumMod val="80000"/>
+    <a:lumOff val="20000"/>
+  </cs:variation>
+  <cs:variation>
+    <a:lumMod val="80000"/>
+  </cs:variation>
+  <cs:variation>
+    <a:lumMod val="60000"/>
+    <a:lumOff val="40000"/>
+  </cs:variation>
+  <cs:variation>
+    <a:lumMod val="50000"/>
+  </cs:variation>
+  <cs:variation>
+    <a:lumMod val="70000"/>
+    <a:lumOff val="30000"/>
+  </cs:variation>
+  <cs:variation>
+    <a:lumMod val="70000"/>
+  </cs:variation>
+  <cs:variation>
+    <a:lumMod val="50000"/>
+    <a:lumOff val="50000"/>
+  </cs:variation>
+</cs:colorStyle>
+</file>
+
 <file path=ppt/charts/colors2.xml><?xml version="1.0" encoding="utf-8"?>
 <cs:colorStyle xmlns:cs="http://schemas.microsoft.com/office/drawing/2012/chartStyle" xmlns:a="http://schemas.openxmlformats.org/drawingml/2006/main" meth="cycle" id="10">
   <a:schemeClr val="accent1"/>
@@ -12817,6 +13110,525 @@
         <a:round/>
       </a:ln>
     </cs:spPr>
+    <cs:defRPr sz="1197" kern="1200"/>
+  </cs:seriesAxis>
+  <cs:seriesLine>
+    <cs:lnRef idx="0"/>
+    <cs:fillRef idx="0"/>
+    <cs:effectRef idx="0"/>
+    <cs:fontRef idx="minor">
+      <a:schemeClr val="tx1"/>
+    </cs:fontRef>
+    <cs:spPr>
+      <a:ln w="9525" cap="flat" cmpd="sng" algn="ctr">
+        <a:solidFill>
+          <a:schemeClr val="tx1">
+            <a:lumMod val="35000"/>
+            <a:lumOff val="65000"/>
+          </a:schemeClr>
+        </a:solidFill>
+        <a:round/>
+      </a:ln>
+    </cs:spPr>
+  </cs:seriesLine>
+  <cs:title>
+    <cs:lnRef idx="0"/>
+    <cs:fillRef idx="0"/>
+    <cs:effectRef idx="0"/>
+    <cs:fontRef idx="minor">
+      <a:schemeClr val="tx1">
+        <a:lumMod val="65000"/>
+        <a:lumOff val="35000"/>
+      </a:schemeClr>
+    </cs:fontRef>
+    <cs:defRPr sz="1862" b="0" kern="1200" spc="0" baseline="0"/>
+  </cs:title>
+  <cs:trendline>
+    <cs:lnRef idx="0">
+      <cs:styleClr val="auto"/>
+    </cs:lnRef>
+    <cs:fillRef idx="0"/>
+    <cs:effectRef idx="0"/>
+    <cs:fontRef idx="minor">
+      <a:schemeClr val="tx1"/>
+    </cs:fontRef>
+    <cs:spPr>
+      <a:ln w="19050" cap="rnd">
+        <a:solidFill>
+          <a:schemeClr val="phClr"/>
+        </a:solidFill>
+        <a:prstDash val="sysDot"/>
+      </a:ln>
+    </cs:spPr>
+  </cs:trendline>
+  <cs:trendlineLabel>
+    <cs:lnRef idx="0"/>
+    <cs:fillRef idx="0"/>
+    <cs:effectRef idx="0"/>
+    <cs:fontRef idx="minor">
+      <a:schemeClr val="tx1">
+        <a:lumMod val="65000"/>
+        <a:lumOff val="35000"/>
+      </a:schemeClr>
+    </cs:fontRef>
+    <cs:defRPr sz="1197" kern="1200"/>
+  </cs:trendlineLabel>
+  <cs:upBar>
+    <cs:lnRef idx="0"/>
+    <cs:fillRef idx="0"/>
+    <cs:effectRef idx="0"/>
+    <cs:fontRef idx="minor">
+      <a:schemeClr val="tx1"/>
+    </cs:fontRef>
+    <cs:spPr>
+      <a:solidFill>
+        <a:schemeClr val="lt1"/>
+      </a:solidFill>
+      <a:ln w="9525" cap="flat" cmpd="sng" algn="ctr">
+        <a:solidFill>
+          <a:schemeClr val="tx1">
+            <a:lumMod val="65000"/>
+            <a:lumOff val="35000"/>
+          </a:schemeClr>
+        </a:solidFill>
+        <a:round/>
+      </a:ln>
+    </cs:spPr>
+  </cs:upBar>
+  <cs:valueAxis>
+    <cs:lnRef idx="0"/>
+    <cs:fillRef idx="0"/>
+    <cs:effectRef idx="0"/>
+    <cs:fontRef idx="minor">
+      <a:schemeClr val="tx1">
+        <a:lumMod val="65000"/>
+        <a:lumOff val="35000"/>
+      </a:schemeClr>
+    </cs:fontRef>
+    <cs:defRPr sz="1197" kern="1200"/>
+  </cs:valueAxis>
+  <cs:wall>
+    <cs:lnRef idx="0"/>
+    <cs:fillRef idx="0"/>
+    <cs:effectRef idx="0"/>
+    <cs:fontRef idx="minor">
+      <a:schemeClr val="tx1"/>
+    </cs:fontRef>
+    <cs:spPr>
+      <a:noFill/>
+      <a:ln>
+        <a:noFill/>
+      </a:ln>
+    </cs:spPr>
+  </cs:wall>
+</cs:chartStyle>
+</file>
+
+<file path=ppt/charts/style18.xml><?xml version="1.0" encoding="utf-8"?>
+<cs:chartStyle xmlns:cs="http://schemas.microsoft.com/office/drawing/2012/chartStyle" xmlns:a="http://schemas.openxmlformats.org/drawingml/2006/main" id="251">
+  <cs:axisTitle>
+    <cs:lnRef idx="0"/>
+    <cs:fillRef idx="0"/>
+    <cs:effectRef idx="0"/>
+    <cs:fontRef idx="minor">
+      <a:schemeClr val="tx1">
+        <a:lumMod val="65000"/>
+        <a:lumOff val="35000"/>
+      </a:schemeClr>
+    </cs:fontRef>
+    <cs:defRPr sz="1330" kern="1200"/>
+  </cs:axisTitle>
+  <cs:categoryAxis>
+    <cs:lnRef idx="0"/>
+    <cs:fillRef idx="0"/>
+    <cs:effectRef idx="0"/>
+    <cs:fontRef idx="minor">
+      <a:schemeClr val="tx1">
+        <a:lumMod val="65000"/>
+        <a:lumOff val="35000"/>
+      </a:schemeClr>
+    </cs:fontRef>
+    <cs:spPr>
+      <a:ln w="9525" cap="flat" cmpd="sng" algn="ctr">
+        <a:solidFill>
+          <a:schemeClr val="tx1">
+            <a:lumMod val="15000"/>
+            <a:lumOff val="85000"/>
+          </a:schemeClr>
+        </a:solidFill>
+        <a:round/>
+      </a:ln>
+    </cs:spPr>
+    <cs:defRPr sz="1197" kern="1200"/>
+  </cs:categoryAxis>
+  <cs:chartArea mods="allowNoFillOverride allowNoLineOverride">
+    <cs:lnRef idx="0"/>
+    <cs:fillRef idx="0"/>
+    <cs:effectRef idx="0"/>
+    <cs:fontRef idx="minor">
+      <a:schemeClr val="tx1"/>
+    </cs:fontRef>
+    <cs:spPr>
+      <a:solidFill>
+        <a:schemeClr val="bg1"/>
+      </a:solidFill>
+      <a:ln w="9525" cap="flat" cmpd="sng" algn="ctr">
+        <a:solidFill>
+          <a:schemeClr val="tx1">
+            <a:lumMod val="15000"/>
+            <a:lumOff val="85000"/>
+          </a:schemeClr>
+        </a:solidFill>
+        <a:round/>
+      </a:ln>
+    </cs:spPr>
+    <cs:defRPr sz="1197" kern="1200"/>
+  </cs:chartArea>
+  <cs:dataLabel>
+    <cs:lnRef idx="0"/>
+    <cs:fillRef idx="0"/>
+    <cs:effectRef idx="0"/>
+    <cs:fontRef idx="minor">
+      <a:schemeClr val="tx1">
+        <a:lumMod val="75000"/>
+        <a:lumOff val="25000"/>
+      </a:schemeClr>
+    </cs:fontRef>
+    <cs:defRPr sz="1197" kern="1200"/>
+  </cs:dataLabel>
+  <cs:dataLabelCallout>
+    <cs:lnRef idx="0"/>
+    <cs:fillRef idx="0"/>
+    <cs:effectRef idx="0"/>
+    <cs:fontRef idx="minor">
+      <a:schemeClr val="dk1">
+        <a:lumMod val="65000"/>
+        <a:lumOff val="35000"/>
+      </a:schemeClr>
+    </cs:fontRef>
+    <cs:spPr>
+      <a:solidFill>
+        <a:schemeClr val="lt1"/>
+      </a:solidFill>
+      <a:ln>
+        <a:solidFill>
+          <a:schemeClr val="dk1">
+            <a:lumMod val="25000"/>
+            <a:lumOff val="75000"/>
+          </a:schemeClr>
+        </a:solidFill>
+      </a:ln>
+    </cs:spPr>
+    <cs:defRPr sz="1197" kern="1200"/>
+    <cs:bodyPr rot="0" spcFirstLastPara="1" vertOverflow="clip" horzOverflow="clip" vert="horz" wrap="square" lIns="36576" tIns="18288" rIns="36576" bIns="18288" anchor="ctr" anchorCtr="1">
+      <a:spAutoFit/>
+    </cs:bodyPr>
+  </cs:dataLabelCallout>
+  <cs:dataPoint>
+    <cs:lnRef idx="0"/>
+    <cs:fillRef idx="1">
+      <cs:styleClr val="auto"/>
+    </cs:fillRef>
+    <cs:effectRef idx="0"/>
+    <cs:fontRef idx="minor">
+      <a:schemeClr val="tx1"/>
+    </cs:fontRef>
+    <cs:spPr>
+      <a:ln w="19050">
+        <a:solidFill>
+          <a:schemeClr val="lt1"/>
+        </a:solidFill>
+      </a:ln>
+    </cs:spPr>
+  </cs:dataPoint>
+  <cs:dataPoint3D>
+    <cs:lnRef idx="0"/>
+    <cs:fillRef idx="1">
+      <cs:styleClr val="auto"/>
+    </cs:fillRef>
+    <cs:effectRef idx="0"/>
+    <cs:fontRef idx="minor">
+      <a:schemeClr val="tx1"/>
+    </cs:fontRef>
+    <cs:spPr>
+      <a:ln w="25400">
+        <a:solidFill>
+          <a:schemeClr val="lt1"/>
+        </a:solidFill>
+      </a:ln>
+    </cs:spPr>
+  </cs:dataPoint3D>
+  <cs:dataPointLine>
+    <cs:lnRef idx="0">
+      <cs:styleClr val="auto"/>
+    </cs:lnRef>
+    <cs:fillRef idx="0"/>
+    <cs:effectRef idx="0"/>
+    <cs:fontRef idx="minor">
+      <a:schemeClr val="tx1"/>
+    </cs:fontRef>
+    <cs:spPr>
+      <a:ln w="28575" cap="rnd">
+        <a:solidFill>
+          <a:schemeClr val="phClr"/>
+        </a:solidFill>
+        <a:round/>
+      </a:ln>
+    </cs:spPr>
+  </cs:dataPointLine>
+  <cs:dataPointMarker>
+    <cs:lnRef idx="0">
+      <cs:styleClr val="auto"/>
+    </cs:lnRef>
+    <cs:fillRef idx="1">
+      <cs:styleClr val="auto"/>
+    </cs:fillRef>
+    <cs:effectRef idx="0"/>
+    <cs:fontRef idx="minor">
+      <a:schemeClr val="tx1"/>
+    </cs:fontRef>
+    <cs:spPr>
+      <a:ln w="9525">
+        <a:solidFill>
+          <a:schemeClr val="phClr"/>
+        </a:solidFill>
+      </a:ln>
+    </cs:spPr>
+  </cs:dataPointMarker>
+  <cs:dataPointMarkerLayout symbol="circle" size="5"/>
+  <cs:dataPointWireframe>
+    <cs:lnRef idx="0">
+      <cs:styleClr val="auto"/>
+    </cs:lnRef>
+    <cs:fillRef idx="0"/>
+    <cs:effectRef idx="0"/>
+    <cs:fontRef idx="minor">
+      <a:schemeClr val="tx1"/>
+    </cs:fontRef>
+    <cs:spPr>
+      <a:ln w="9525" cap="rnd">
+        <a:solidFill>
+          <a:schemeClr val="phClr"/>
+        </a:solidFill>
+        <a:round/>
+      </a:ln>
+    </cs:spPr>
+  </cs:dataPointWireframe>
+  <cs:dataTable>
+    <cs:lnRef idx="0"/>
+    <cs:fillRef idx="0"/>
+    <cs:effectRef idx="0"/>
+    <cs:fontRef idx="minor">
+      <a:schemeClr val="tx1">
+        <a:lumMod val="65000"/>
+        <a:lumOff val="35000"/>
+      </a:schemeClr>
+    </cs:fontRef>
+    <cs:spPr>
+      <a:noFill/>
+      <a:ln w="9525" cap="flat" cmpd="sng" algn="ctr">
+        <a:solidFill>
+          <a:schemeClr val="tx1">
+            <a:lumMod val="15000"/>
+            <a:lumOff val="85000"/>
+          </a:schemeClr>
+        </a:solidFill>
+        <a:round/>
+      </a:ln>
+    </cs:spPr>
+    <cs:defRPr sz="1197" kern="1200"/>
+  </cs:dataTable>
+  <cs:downBar>
+    <cs:lnRef idx="0"/>
+    <cs:fillRef idx="0"/>
+    <cs:effectRef idx="0"/>
+    <cs:fontRef idx="minor">
+      <a:schemeClr val="tx1"/>
+    </cs:fontRef>
+    <cs:spPr>
+      <a:solidFill>
+        <a:schemeClr val="dk1">
+          <a:lumMod val="75000"/>
+          <a:lumOff val="25000"/>
+        </a:schemeClr>
+      </a:solidFill>
+      <a:ln w="9525" cap="flat" cmpd="sng" algn="ctr">
+        <a:solidFill>
+          <a:schemeClr val="tx1">
+            <a:lumMod val="65000"/>
+            <a:lumOff val="35000"/>
+          </a:schemeClr>
+        </a:solidFill>
+        <a:round/>
+      </a:ln>
+    </cs:spPr>
+  </cs:downBar>
+  <cs:dropLine>
+    <cs:lnRef idx="0"/>
+    <cs:fillRef idx="0"/>
+    <cs:effectRef idx="0"/>
+    <cs:fontRef idx="minor">
+      <a:schemeClr val="tx1"/>
+    </cs:fontRef>
+    <cs:spPr>
+      <a:ln w="9525" cap="flat" cmpd="sng" algn="ctr">
+        <a:solidFill>
+          <a:schemeClr val="tx1">
+            <a:lumMod val="35000"/>
+            <a:lumOff val="65000"/>
+          </a:schemeClr>
+        </a:solidFill>
+        <a:round/>
+      </a:ln>
+    </cs:spPr>
+  </cs:dropLine>
+  <cs:errorBar>
+    <cs:lnRef idx="0"/>
+    <cs:fillRef idx="0"/>
+    <cs:effectRef idx="0"/>
+    <cs:fontRef idx="minor">
+      <a:schemeClr val="tx1"/>
+    </cs:fontRef>
+    <cs:spPr>
+      <a:ln w="9525" cap="flat" cmpd="sng" algn="ctr">
+        <a:solidFill>
+          <a:schemeClr val="tx1">
+            <a:lumMod val="65000"/>
+            <a:lumOff val="35000"/>
+          </a:schemeClr>
+        </a:solidFill>
+        <a:round/>
+      </a:ln>
+    </cs:spPr>
+  </cs:errorBar>
+  <cs:floor>
+    <cs:lnRef idx="0"/>
+    <cs:fillRef idx="0"/>
+    <cs:effectRef idx="0"/>
+    <cs:fontRef idx="minor">
+      <a:schemeClr val="tx1"/>
+    </cs:fontRef>
+    <cs:spPr>
+      <a:noFill/>
+      <a:ln>
+        <a:noFill/>
+      </a:ln>
+    </cs:spPr>
+  </cs:floor>
+  <cs:gridlineMajor>
+    <cs:lnRef idx="0"/>
+    <cs:fillRef idx="0"/>
+    <cs:effectRef idx="0"/>
+    <cs:fontRef idx="minor">
+      <a:schemeClr val="tx1"/>
+    </cs:fontRef>
+    <cs:spPr>
+      <a:ln w="9525" cap="flat" cmpd="sng" algn="ctr">
+        <a:solidFill>
+          <a:schemeClr val="tx1">
+            <a:lumMod val="15000"/>
+            <a:lumOff val="85000"/>
+          </a:schemeClr>
+        </a:solidFill>
+        <a:round/>
+      </a:ln>
+    </cs:spPr>
+  </cs:gridlineMajor>
+  <cs:gridlineMinor>
+    <cs:lnRef idx="0"/>
+    <cs:fillRef idx="0"/>
+    <cs:effectRef idx="0"/>
+    <cs:fontRef idx="minor">
+      <a:schemeClr val="tx1"/>
+    </cs:fontRef>
+    <cs:spPr>
+      <a:ln w="9525" cap="flat" cmpd="sng" algn="ctr">
+        <a:solidFill>
+          <a:schemeClr val="tx1">
+            <a:lumMod val="5000"/>
+            <a:lumOff val="95000"/>
+          </a:schemeClr>
+        </a:solidFill>
+        <a:round/>
+      </a:ln>
+    </cs:spPr>
+  </cs:gridlineMinor>
+  <cs:hiLoLine>
+    <cs:lnRef idx="0"/>
+    <cs:fillRef idx="0"/>
+    <cs:effectRef idx="0"/>
+    <cs:fontRef idx="minor">
+      <a:schemeClr val="tx1"/>
+    </cs:fontRef>
+    <cs:spPr>
+      <a:ln w="9525" cap="flat" cmpd="sng" algn="ctr">
+        <a:solidFill>
+          <a:schemeClr val="tx1">
+            <a:lumMod val="50000"/>
+            <a:lumOff val="50000"/>
+          </a:schemeClr>
+        </a:solidFill>
+        <a:round/>
+      </a:ln>
+    </cs:spPr>
+  </cs:hiLoLine>
+  <cs:leaderLine>
+    <cs:lnRef idx="0"/>
+    <cs:fillRef idx="0"/>
+    <cs:effectRef idx="0"/>
+    <cs:fontRef idx="minor">
+      <a:schemeClr val="tx1"/>
+    </cs:fontRef>
+    <cs:spPr>
+      <a:ln w="9525" cap="flat" cmpd="sng" algn="ctr">
+        <a:solidFill>
+          <a:schemeClr val="tx1">
+            <a:lumMod val="35000"/>
+            <a:lumOff val="65000"/>
+          </a:schemeClr>
+        </a:solidFill>
+        <a:round/>
+      </a:ln>
+    </cs:spPr>
+  </cs:leaderLine>
+  <cs:legend>
+    <cs:lnRef idx="0"/>
+    <cs:fillRef idx="0"/>
+    <cs:effectRef idx="0"/>
+    <cs:fontRef idx="minor">
+      <a:schemeClr val="tx1">
+        <a:lumMod val="65000"/>
+        <a:lumOff val="35000"/>
+      </a:schemeClr>
+    </cs:fontRef>
+    <cs:defRPr sz="1197" kern="1200"/>
+  </cs:legend>
+  <cs:plotArea mods="allowNoFillOverride allowNoLineOverride">
+    <cs:lnRef idx="0"/>
+    <cs:fillRef idx="0"/>
+    <cs:effectRef idx="0"/>
+    <cs:fontRef idx="minor">
+      <a:schemeClr val="tx1"/>
+    </cs:fontRef>
+  </cs:plotArea>
+  <cs:plotArea3D mods="allowNoFillOverride allowNoLineOverride">
+    <cs:lnRef idx="0"/>
+    <cs:fillRef idx="0"/>
+    <cs:effectRef idx="0"/>
+    <cs:fontRef idx="minor">
+      <a:schemeClr val="tx1"/>
+    </cs:fontRef>
+  </cs:plotArea3D>
+  <cs:seriesAxis>
+    <cs:lnRef idx="0"/>
+    <cs:fillRef idx="0"/>
+    <cs:effectRef idx="0"/>
+    <cs:fontRef idx="minor">
+      <a:schemeClr val="tx1">
+        <a:lumMod val="65000"/>
+        <a:lumOff val="35000"/>
+      </a:schemeClr>
+    </cs:fontRef>
     <cs:defRPr sz="1197" kern="1200"/>
   </cs:seriesAxis>
   <cs:seriesLine>
@@ -19328,7 +20140,7 @@
           <a:p>
             <a:fld id="{13E8670D-DACE-4106-9284-EFC2D346D8FE}" type="datetimeFigureOut">
               <a:rPr lang="en-US" smtClean="0"/>
-              <a:t>7/31/2020</a:t>
+              <a:t>2/22/2021</a:t>
             </a:fld>
             <a:endParaRPr lang="en-US" dirty="0"/>
           </a:p>
@@ -19493,7 +20305,7 @@
           <a:p>
             <a:fld id="{B55C8D6E-200A-4257-BFED-522F4EBA3D4A}" type="datetimeFigureOut">
               <a:rPr lang="en-US" smtClean="0"/>
-              <a:t>7/31/2020</a:t>
+              <a:t>2/22/2021</a:t>
             </a:fld>
             <a:endParaRPr lang="en-US" dirty="0"/>
           </a:p>
@@ -19876,7 +20688,7 @@
           <a:p>
             <a:fld id="{DE2C6F76-5EDA-4247-B34D-42592F5122A8}" type="datetime1">
               <a:rPr lang="en-US" smtClean="0"/>
-              <a:t>7/31/2020</a:t>
+              <a:t>2/22/2021</a:t>
             </a:fld>
             <a:endParaRPr lang="en-US" dirty="0"/>
           </a:p>
@@ -20076,7 +20888,7 @@
             <a:fld id="{33D6D1A4-82FD-416F-B454-ACF63A7912F0}" type="datetime1">
               <a:rPr lang="en-US" smtClean="0"/>
               <a:pPr/>
-              <a:t>7/31/2020</a:t>
+              <a:t>2/22/2021</a:t>
             </a:fld>
             <a:endParaRPr lang="en-US" dirty="0"/>
           </a:p>
@@ -21281,7 +22093,7 @@
           <p:nvPr>
             <p:extLst>
               <p:ext uri="{D42A27DB-BD31-4B8C-83A1-F6EECF244321}">
-                <p14:modId xmlns:p14="http://schemas.microsoft.com/office/powerpoint/2010/main" val="2216966373"/>
+                <p14:modId xmlns:p14="http://schemas.microsoft.com/office/powerpoint/2010/main" val="1591859657"/>
               </p:ext>
             </p:extLst>
           </p:nvPr>
@@ -21349,6 +22161,34 @@
         <a:graphic>
           <a:graphicData uri="http://schemas.openxmlformats.org/drawingml/2006/chart">
             <c:chart xmlns:c="http://schemas.openxmlformats.org/drawingml/2006/chart" xmlns:r="http://schemas.openxmlformats.org/officeDocument/2006/relationships" r:id="rId28"/>
+          </a:graphicData>
+        </a:graphic>
+      </p:graphicFrame>
+      <p:graphicFrame>
+        <p:nvGraphicFramePr>
+          <p:cNvPr id="20" name="Donut Chart">
+            <a:extLst>
+              <a:ext uri="{FF2B5EF4-FFF2-40B4-BE49-F238E27FC236}">
+                <a16:creationId xmlns:a16="http://schemas.microsoft.com/office/drawing/2014/main" id="{0B7381E1-0F52-4484-B7AC-586041FD0646}"/>
+              </a:ext>
+            </a:extLst>
+          </p:cNvPr>
+          <p:cNvGraphicFramePr/>
+          <p:nvPr>
+            <p:extLst>
+              <p:ext uri="{D42A27DB-BD31-4B8C-83A1-F6EECF244321}">
+                <p14:modId xmlns:p14="http://schemas.microsoft.com/office/powerpoint/2010/main" val="484546277"/>
+              </p:ext>
+            </p:extLst>
+          </p:nvPr>
+        </p:nvGraphicFramePr>
+        <p:xfrm>
+          <a:off x="9387839" y="4544567"/>
+          <a:ext cx="1828800" cy="1828800"/>
+        </p:xfrm>
+        <a:graphic>
+          <a:graphicData uri="http://schemas.openxmlformats.org/drawingml/2006/chart">
+            <c:chart xmlns:c="http://schemas.openxmlformats.org/drawingml/2006/chart" xmlns:r="http://schemas.openxmlformats.org/officeDocument/2006/relationships" r:id="rId29"/>
           </a:graphicData>
         </a:graphic>
       </p:graphicFrame>

</xml_diff>

<commit_message>
ENH: PPTXHandler supports charts.{data,fill,stroke,text}
</commit_message>
<xml_diff>
--- a/testlib/input2.pptx
+++ b/testlib/input2.pptx
@@ -3959,6 +3959,36 @@
     </mc:Fallback>
   </mc:AlternateContent>
   <c:chart>
+    <c:title>
+      <c:overlay val="0"/>
+      <c:spPr>
+        <a:noFill/>
+        <a:ln>
+          <a:noFill/>
+        </a:ln>
+        <a:effectLst/>
+      </c:spPr>
+      <c:txPr>
+        <a:bodyPr rot="0" spcFirstLastPara="1" vertOverflow="ellipsis" vert="horz" wrap="square" anchor="ctr" anchorCtr="1"/>
+        <a:lstStyle/>
+        <a:p>
+          <a:pPr>
+            <a:defRPr sz="720" b="0" i="0" u="none" strike="noStrike" kern="1200" spc="0" baseline="0">
+              <a:solidFill>
+                <a:schemeClr val="tx1">
+                  <a:lumMod val="65000"/>
+                  <a:lumOff val="35000"/>
+                </a:schemeClr>
+              </a:solidFill>
+              <a:latin typeface="+mn-lt"/>
+              <a:ea typeface="+mn-ea"/>
+              <a:cs typeface="+mn-cs"/>
+            </a:defRPr>
+          </a:pPr>
+          <a:endParaRPr lang="en-US"/>
+        </a:p>
+      </c:txPr>
+    </c:title>
     <c:autoTitleDeleted val="0"/>
     <c:plotArea>
       <c:layout/>
@@ -3990,82 +4020,6 @@
             <a:effectLst/>
           </c:spPr>
           <c:invertIfNegative val="0"/>
-          <c:dPt>
-            <c:idx val="0"/>
-            <c:invertIfNegative val="0"/>
-            <c:bubble3D val="0"/>
-            <c:spPr>
-              <a:solidFill>
-                <a:schemeClr val="accent1"/>
-              </a:solidFill>
-              <a:ln>
-                <a:noFill/>
-              </a:ln>
-              <a:effectLst/>
-            </c:spPr>
-            <c:extLst>
-              <c:ext xmlns:c16="http://schemas.microsoft.com/office/drawing/2014/chart" uri="{C3380CC4-5D6E-409C-BE32-E72D297353CC}">
-                <c16:uniqueId val="{00000001-69A8-4069-8B0F-097DCE6F3A7A}"/>
-              </c:ext>
-            </c:extLst>
-          </c:dPt>
-          <c:dPt>
-            <c:idx val="1"/>
-            <c:invertIfNegative val="0"/>
-            <c:bubble3D val="0"/>
-            <c:spPr>
-              <a:solidFill>
-                <a:schemeClr val="accent1"/>
-              </a:solidFill>
-              <a:ln>
-                <a:noFill/>
-              </a:ln>
-              <a:effectLst/>
-            </c:spPr>
-            <c:extLst>
-              <c:ext xmlns:c16="http://schemas.microsoft.com/office/drawing/2014/chart" uri="{C3380CC4-5D6E-409C-BE32-E72D297353CC}">
-                <c16:uniqueId val="{00000003-69A8-4069-8B0F-097DCE6F3A7A}"/>
-              </c:ext>
-            </c:extLst>
-          </c:dPt>
-          <c:dPt>
-            <c:idx val="2"/>
-            <c:invertIfNegative val="0"/>
-            <c:bubble3D val="0"/>
-            <c:spPr>
-              <a:solidFill>
-                <a:schemeClr val="accent1"/>
-              </a:solidFill>
-              <a:ln>
-                <a:noFill/>
-              </a:ln>
-              <a:effectLst/>
-            </c:spPr>
-            <c:extLst>
-              <c:ext xmlns:c16="http://schemas.microsoft.com/office/drawing/2014/chart" uri="{C3380CC4-5D6E-409C-BE32-E72D297353CC}">
-                <c16:uniqueId val="{00000005-69A8-4069-8B0F-097DCE6F3A7A}"/>
-              </c:ext>
-            </c:extLst>
-          </c:dPt>
-          <c:dPt>
-            <c:idx val="3"/>
-            <c:invertIfNegative val="0"/>
-            <c:bubble3D val="0"/>
-            <c:spPr>
-              <a:solidFill>
-                <a:schemeClr val="accent1"/>
-              </a:solidFill>
-              <a:ln>
-                <a:noFill/>
-              </a:ln>
-              <a:effectLst/>
-            </c:spPr>
-            <c:extLst>
-              <c:ext xmlns:c16="http://schemas.microsoft.com/office/drawing/2014/chart" uri="{C3380CC4-5D6E-409C-BE32-E72D297353CC}">
-                <c16:uniqueId val="{00000007-69A8-4069-8B0F-097DCE6F3A7A}"/>
-              </c:ext>
-            </c:extLst>
-          </c:dPt>
           <c:cat>
             <c:strRef>
               <c:f>Sheet1!$A$2:$A$5</c:f>
@@ -4109,7 +4063,7 @@
           </c:val>
           <c:extLst>
             <c:ext xmlns:c16="http://schemas.microsoft.com/office/drawing/2014/chart" uri="{C3380CC4-5D6E-409C-BE32-E72D297353CC}">
-              <c16:uniqueId val="{00000000-DD57-45BD-8F95-443783A3F5D8}"/>
+              <c16:uniqueId val="{00000000-7E19-4B61-97A8-8930CB2C84F7}"/>
             </c:ext>
           </c:extLst>
         </c:ser>
@@ -4137,82 +4091,6 @@
             <a:effectLst/>
           </c:spPr>
           <c:invertIfNegative val="0"/>
-          <c:dPt>
-            <c:idx val="0"/>
-            <c:invertIfNegative val="0"/>
-            <c:bubble3D val="0"/>
-            <c:spPr>
-              <a:solidFill>
-                <a:schemeClr val="accent2"/>
-              </a:solidFill>
-              <a:ln>
-                <a:noFill/>
-              </a:ln>
-              <a:effectLst/>
-            </c:spPr>
-            <c:extLst>
-              <c:ext xmlns:c16="http://schemas.microsoft.com/office/drawing/2014/chart" uri="{C3380CC4-5D6E-409C-BE32-E72D297353CC}">
-                <c16:uniqueId val="{00000009-69A8-4069-8B0F-097DCE6F3A7A}"/>
-              </c:ext>
-            </c:extLst>
-          </c:dPt>
-          <c:dPt>
-            <c:idx val="1"/>
-            <c:invertIfNegative val="0"/>
-            <c:bubble3D val="0"/>
-            <c:spPr>
-              <a:solidFill>
-                <a:schemeClr val="accent2"/>
-              </a:solidFill>
-              <a:ln>
-                <a:noFill/>
-              </a:ln>
-              <a:effectLst/>
-            </c:spPr>
-            <c:extLst>
-              <c:ext xmlns:c16="http://schemas.microsoft.com/office/drawing/2014/chart" uri="{C3380CC4-5D6E-409C-BE32-E72D297353CC}">
-                <c16:uniqueId val="{0000000B-69A8-4069-8B0F-097DCE6F3A7A}"/>
-              </c:ext>
-            </c:extLst>
-          </c:dPt>
-          <c:dPt>
-            <c:idx val="2"/>
-            <c:invertIfNegative val="0"/>
-            <c:bubble3D val="0"/>
-            <c:spPr>
-              <a:solidFill>
-                <a:schemeClr val="accent2"/>
-              </a:solidFill>
-              <a:ln>
-                <a:noFill/>
-              </a:ln>
-              <a:effectLst/>
-            </c:spPr>
-            <c:extLst>
-              <c:ext xmlns:c16="http://schemas.microsoft.com/office/drawing/2014/chart" uri="{C3380CC4-5D6E-409C-BE32-E72D297353CC}">
-                <c16:uniqueId val="{0000000D-69A8-4069-8B0F-097DCE6F3A7A}"/>
-              </c:ext>
-            </c:extLst>
-          </c:dPt>
-          <c:dPt>
-            <c:idx val="3"/>
-            <c:invertIfNegative val="0"/>
-            <c:bubble3D val="0"/>
-            <c:spPr>
-              <a:solidFill>
-                <a:schemeClr val="accent2"/>
-              </a:solidFill>
-              <a:ln>
-                <a:noFill/>
-              </a:ln>
-              <a:effectLst/>
-            </c:spPr>
-            <c:extLst>
-              <c:ext xmlns:c16="http://schemas.microsoft.com/office/drawing/2014/chart" uri="{C3380CC4-5D6E-409C-BE32-E72D297353CC}">
-                <c16:uniqueId val="{0000000F-69A8-4069-8B0F-097DCE6F3A7A}"/>
-              </c:ext>
-            </c:extLst>
-          </c:dPt>
           <c:cat>
             <c:strRef>
               <c:f>Sheet1!$A$2:$A$5</c:f>
@@ -4256,7 +4134,7 @@
           </c:val>
           <c:extLst>
             <c:ext xmlns:c16="http://schemas.microsoft.com/office/drawing/2014/chart" uri="{C3380CC4-5D6E-409C-BE32-E72D297353CC}">
-              <c16:uniqueId val="{00000001-DD57-45BD-8F95-443783A3F5D8}"/>
+              <c16:uniqueId val="{00000001-7E19-4B61-97A8-8930CB2C84F7}"/>
             </c:ext>
           </c:extLst>
         </c:ser>
@@ -4284,82 +4162,6 @@
             <a:effectLst/>
           </c:spPr>
           <c:invertIfNegative val="0"/>
-          <c:dPt>
-            <c:idx val="0"/>
-            <c:invertIfNegative val="0"/>
-            <c:bubble3D val="0"/>
-            <c:spPr>
-              <a:solidFill>
-                <a:schemeClr val="accent3"/>
-              </a:solidFill>
-              <a:ln>
-                <a:noFill/>
-              </a:ln>
-              <a:effectLst/>
-            </c:spPr>
-            <c:extLst>
-              <c:ext xmlns:c16="http://schemas.microsoft.com/office/drawing/2014/chart" uri="{C3380CC4-5D6E-409C-BE32-E72D297353CC}">
-                <c16:uniqueId val="{00000011-69A8-4069-8B0F-097DCE6F3A7A}"/>
-              </c:ext>
-            </c:extLst>
-          </c:dPt>
-          <c:dPt>
-            <c:idx val="1"/>
-            <c:invertIfNegative val="0"/>
-            <c:bubble3D val="0"/>
-            <c:spPr>
-              <a:solidFill>
-                <a:schemeClr val="accent3"/>
-              </a:solidFill>
-              <a:ln>
-                <a:noFill/>
-              </a:ln>
-              <a:effectLst/>
-            </c:spPr>
-            <c:extLst>
-              <c:ext xmlns:c16="http://schemas.microsoft.com/office/drawing/2014/chart" uri="{C3380CC4-5D6E-409C-BE32-E72D297353CC}">
-                <c16:uniqueId val="{00000013-69A8-4069-8B0F-097DCE6F3A7A}"/>
-              </c:ext>
-            </c:extLst>
-          </c:dPt>
-          <c:dPt>
-            <c:idx val="2"/>
-            <c:invertIfNegative val="0"/>
-            <c:bubble3D val="0"/>
-            <c:spPr>
-              <a:solidFill>
-                <a:schemeClr val="accent3"/>
-              </a:solidFill>
-              <a:ln>
-                <a:noFill/>
-              </a:ln>
-              <a:effectLst/>
-            </c:spPr>
-            <c:extLst>
-              <c:ext xmlns:c16="http://schemas.microsoft.com/office/drawing/2014/chart" uri="{C3380CC4-5D6E-409C-BE32-E72D297353CC}">
-                <c16:uniqueId val="{00000015-69A8-4069-8B0F-097DCE6F3A7A}"/>
-              </c:ext>
-            </c:extLst>
-          </c:dPt>
-          <c:dPt>
-            <c:idx val="3"/>
-            <c:invertIfNegative val="0"/>
-            <c:bubble3D val="0"/>
-            <c:spPr>
-              <a:solidFill>
-                <a:schemeClr val="accent3"/>
-              </a:solidFill>
-              <a:ln>
-                <a:noFill/>
-              </a:ln>
-              <a:effectLst/>
-            </c:spPr>
-            <c:extLst>
-              <c:ext xmlns:c16="http://schemas.microsoft.com/office/drawing/2014/chart" uri="{C3380CC4-5D6E-409C-BE32-E72D297353CC}">
-                <c16:uniqueId val="{00000017-69A8-4069-8B0F-097DCE6F3A7A}"/>
-              </c:ext>
-            </c:extLst>
-          </c:dPt>
           <c:cat>
             <c:strRef>
               <c:f>Sheet1!$A$2:$A$5</c:f>
@@ -4403,7 +4205,7 @@
           </c:val>
           <c:extLst>
             <c:ext xmlns:c16="http://schemas.microsoft.com/office/drawing/2014/chart" uri="{C3380CC4-5D6E-409C-BE32-E72D297353CC}">
-              <c16:uniqueId val="{00000002-DD57-45BD-8F95-443783A3F5D8}"/>
+              <c16:uniqueId val="{00000002-7E19-4B61-97A8-8930CB2C84F7}"/>
             </c:ext>
           </c:extLst>
         </c:ser>
@@ -4415,75 +4217,19 @@
           <c:showPercent val="0"/>
           <c:showBubbleSize val="0"/>
         </c:dLbls>
-        <c:gapWidth val="100"/>
-        <c:axId val="1346113967"/>
-        <c:axId val="2003779295"/>
+        <c:gapWidth val="219"/>
+        <c:axId val="1490497407"/>
+        <c:axId val="2003764735"/>
       </c:barChart>
-      <c:valAx>
-        <c:axId val="2003779295"/>
-        <c:scaling>
-          <c:orientation val="minMax"/>
-        </c:scaling>
-        <c:delete val="0"/>
-        <c:axPos val="b"/>
-        <c:majorGridlines>
-          <c:spPr>
-            <a:ln w="9525" cap="flat" cmpd="sng" algn="ctr">
-              <a:solidFill>
-                <a:schemeClr val="tx1">
-                  <a:lumMod val="15000"/>
-                  <a:lumOff val="85000"/>
-                </a:schemeClr>
-              </a:solidFill>
-              <a:round/>
-            </a:ln>
-            <a:effectLst/>
-          </c:spPr>
-        </c:majorGridlines>
-        <c:numFmt formatCode="General" sourceLinked="1"/>
-        <c:majorTickMark val="out"/>
-        <c:minorTickMark val="none"/>
-        <c:tickLblPos val="nextTo"/>
-        <c:spPr>
-          <a:noFill/>
-          <a:ln>
-            <a:noFill/>
-          </a:ln>
-          <a:effectLst/>
-        </c:spPr>
-        <c:txPr>
-          <a:bodyPr rot="-60000000" spcFirstLastPara="1" vertOverflow="ellipsis" vert="horz" wrap="square" anchor="ctr" anchorCtr="1"/>
-          <a:lstStyle/>
-          <a:p>
-            <a:pPr>
-              <a:defRPr sz="600" b="0" i="0" u="none" strike="noStrike" kern="1200" baseline="0">
-                <a:solidFill>
-                  <a:schemeClr val="tx1">
-                    <a:lumMod val="65000"/>
-                    <a:lumOff val="35000"/>
-                  </a:schemeClr>
-                </a:solidFill>
-                <a:latin typeface="+mn-lt"/>
-                <a:ea typeface="+mn-ea"/>
-                <a:cs typeface="+mn-cs"/>
-              </a:defRPr>
-            </a:pPr>
-            <a:endParaRPr lang="en-US"/>
-          </a:p>
-        </c:txPr>
-        <c:crossAx val="1346113967"/>
-        <c:crosses val="autoZero"/>
-        <c:crossBetween val="between"/>
-      </c:valAx>
       <c:catAx>
-        <c:axId val="1346113967"/>
+        <c:axId val="1490497407"/>
         <c:scaling>
           <c:orientation val="minMax"/>
         </c:scaling>
         <c:delete val="0"/>
         <c:axPos val="l"/>
         <c:numFmt formatCode="General" sourceLinked="1"/>
-        <c:majorTickMark val="out"/>
+        <c:majorTickMark val="none"/>
         <c:minorTickMark val="none"/>
         <c:tickLblPos val="nextTo"/>
         <c:spPr>
@@ -4519,13 +4265,69 @@
             <a:endParaRPr lang="en-US"/>
           </a:p>
         </c:txPr>
-        <c:crossAx val="2003779295"/>
+        <c:crossAx val="2003764735"/>
         <c:crosses val="autoZero"/>
         <c:auto val="1"/>
         <c:lblAlgn val="ctr"/>
         <c:lblOffset val="100"/>
         <c:noMultiLvlLbl val="0"/>
       </c:catAx>
+      <c:valAx>
+        <c:axId val="2003764735"/>
+        <c:scaling>
+          <c:orientation val="minMax"/>
+        </c:scaling>
+        <c:delete val="0"/>
+        <c:axPos val="b"/>
+        <c:majorGridlines>
+          <c:spPr>
+            <a:ln w="9525" cap="flat" cmpd="sng" algn="ctr">
+              <a:solidFill>
+                <a:schemeClr val="tx1">
+                  <a:lumMod val="15000"/>
+                  <a:lumOff val="85000"/>
+                </a:schemeClr>
+              </a:solidFill>
+              <a:round/>
+            </a:ln>
+            <a:effectLst/>
+          </c:spPr>
+        </c:majorGridlines>
+        <c:numFmt formatCode="General" sourceLinked="1"/>
+        <c:majorTickMark val="none"/>
+        <c:minorTickMark val="none"/>
+        <c:tickLblPos val="nextTo"/>
+        <c:spPr>
+          <a:noFill/>
+          <a:ln>
+            <a:noFill/>
+          </a:ln>
+          <a:effectLst/>
+        </c:spPr>
+        <c:txPr>
+          <a:bodyPr rot="-60000000" spcFirstLastPara="1" vertOverflow="ellipsis" vert="horz" wrap="square" anchor="ctr" anchorCtr="1"/>
+          <a:lstStyle/>
+          <a:p>
+            <a:pPr>
+              <a:defRPr sz="600" b="0" i="0" u="none" strike="noStrike" kern="1200" baseline="0">
+                <a:solidFill>
+                  <a:schemeClr val="tx1">
+                    <a:lumMod val="65000"/>
+                    <a:lumOff val="35000"/>
+                  </a:schemeClr>
+                </a:solidFill>
+                <a:latin typeface="+mn-lt"/>
+                <a:ea typeface="+mn-ea"/>
+                <a:cs typeface="+mn-cs"/>
+              </a:defRPr>
+            </a:pPr>
+            <a:endParaRPr lang="en-US"/>
+          </a:p>
+        </c:txPr>
+        <c:crossAx val="1490497407"/>
+        <c:crosses val="autoZero"/>
+        <c:crossBetween val="between"/>
+      </c:valAx>
       <c:spPr>
         <a:noFill/>
         <a:ln>
@@ -20140,7 +19942,7 @@
           <a:p>
             <a:fld id="{13E8670D-DACE-4106-9284-EFC2D346D8FE}" type="datetimeFigureOut">
               <a:rPr lang="en-US" smtClean="0"/>
-              <a:t>2/22/2021</a:t>
+              <a:t>11/9/2021</a:t>
             </a:fld>
             <a:endParaRPr lang="en-US" dirty="0"/>
           </a:p>
@@ -20305,7 +20107,7 @@
           <a:p>
             <a:fld id="{B55C8D6E-200A-4257-BFED-522F4EBA3D4A}" type="datetimeFigureOut">
               <a:rPr lang="en-US" smtClean="0"/>
-              <a:t>2/22/2021</a:t>
+              <a:t>11/9/2021</a:t>
             </a:fld>
             <a:endParaRPr lang="en-US" dirty="0"/>
           </a:p>
@@ -20688,7 +20490,7 @@
           <a:p>
             <a:fld id="{DE2C6F76-5EDA-4247-B34D-42592F5122A8}" type="datetime1">
               <a:rPr lang="en-US" smtClean="0"/>
-              <a:t>2/22/2021</a:t>
+              <a:t>11/9/2021</a:t>
             </a:fld>
             <a:endParaRPr lang="en-US" dirty="0"/>
           </a:p>
@@ -20888,7 +20690,7 @@
             <a:fld id="{33D6D1A4-82FD-416F-B454-ACF63A7912F0}" type="datetime1">
               <a:rPr lang="en-US" smtClean="0"/>
               <a:pPr/>
-              <a:t>2/22/2021</a:t>
+              <a:t>11/9/2021</a:t>
             </a:fld>
             <a:endParaRPr lang="en-US" dirty="0"/>
           </a:p>
@@ -21530,10 +21332,10 @@
       </p:graphicFrame>
       <p:graphicFrame>
         <p:nvGraphicFramePr>
-          <p:cNvPr id="8" name="Bar Chart">
+          <p:cNvPr id="21" name="Bar Chart">
             <a:extLst>
               <a:ext uri="{FF2B5EF4-FFF2-40B4-BE49-F238E27FC236}">
-                <a16:creationId xmlns:a16="http://schemas.microsoft.com/office/drawing/2014/main" id="{791BD9D4-369E-424E-A0EB-C90201047FEE}"/>
+                <a16:creationId xmlns:a16="http://schemas.microsoft.com/office/drawing/2014/main" id="{7A192B80-07A6-4D27-8B59-5705B8C9A94D}"/>
               </a:ext>
             </a:extLst>
           </p:cNvPr>
@@ -21541,7 +21343,7 @@
           <p:nvPr>
             <p:extLst>
               <p:ext uri="{D42A27DB-BD31-4B8C-83A1-F6EECF244321}">
-                <p14:modId xmlns:p14="http://schemas.microsoft.com/office/powerpoint/2010/main" val="1610777100"/>
+                <p14:modId xmlns:p14="http://schemas.microsoft.com/office/powerpoint/2010/main" val="2092100669"/>
               </p:ext>
             </p:extLst>
           </p:nvPr>

</xml_diff>